<commit_message>
Updating most recent changes to the class documentation
</commit_message>
<xml_diff>
--- a/misc/certificate-template.pptx
+++ b/misc/certificate-template.pptx
@@ -7,7 +7,6 @@
   <p:sldIdLst>
     <p:sldId id="259" r:id="rId2"/>
     <p:sldId id="257" r:id="rId3"/>
-    <p:sldId id="261" r:id="rId4"/>
   </p:sldIdLst>
   <p:sldSz cx="10058400" cy="7772400"/>
   <p:notesSz cx="7315200" cy="9601200"/>
@@ -783,7 +782,7 @@
           <a:p>
             <a:fld id="{62CD7716-E68F-4B01-8ADA-26CD6F61229D}" type="datetimeFigureOut">
               <a:rPr lang="es-CR" smtClean="0"/>
-              <a:t>9/8/2017</a:t>
+              <a:t>19/3/2019</a:t>
             </a:fld>
             <a:endParaRPr lang="es-CR"/>
           </a:p>
@@ -966,7 +965,7 @@
           <a:p>
             <a:fld id="{62CD7716-E68F-4B01-8ADA-26CD6F61229D}" type="datetimeFigureOut">
               <a:rPr lang="es-CR" smtClean="0"/>
-              <a:t>9/8/2017</a:t>
+              <a:t>19/3/2019</a:t>
             </a:fld>
             <a:endParaRPr lang="es-CR"/>
           </a:p>
@@ -1141,7 +1140,7 @@
           <a:p>
             <a:fld id="{62CD7716-E68F-4B01-8ADA-26CD6F61229D}" type="datetimeFigureOut">
               <a:rPr lang="es-CR" smtClean="0"/>
-              <a:t>9/8/2017</a:t>
+              <a:t>19/3/2019</a:t>
             </a:fld>
             <a:endParaRPr lang="es-CR"/>
           </a:p>
@@ -1306,7 +1305,7 @@
           <a:p>
             <a:fld id="{62CD7716-E68F-4B01-8ADA-26CD6F61229D}" type="datetimeFigureOut">
               <a:rPr lang="es-CR" smtClean="0"/>
-              <a:t>9/8/2017</a:t>
+              <a:t>19/3/2019</a:t>
             </a:fld>
             <a:endParaRPr lang="es-CR"/>
           </a:p>
@@ -1527,7 +1526,7 @@
           <a:p>
             <a:fld id="{62CD7716-E68F-4B01-8ADA-26CD6F61229D}" type="datetimeFigureOut">
               <a:rPr lang="es-CR" smtClean="0"/>
-              <a:t>9/8/2017</a:t>
+              <a:t>19/3/2019</a:t>
             </a:fld>
             <a:endParaRPr lang="es-CR"/>
           </a:p>
@@ -1786,7 +1785,7 @@
           <a:p>
             <a:fld id="{62CD7716-E68F-4B01-8ADA-26CD6F61229D}" type="datetimeFigureOut">
               <a:rPr lang="es-CR" smtClean="0"/>
-              <a:t>9/8/2017</a:t>
+              <a:t>19/3/2019</a:t>
             </a:fld>
             <a:endParaRPr lang="es-CR"/>
           </a:p>
@@ -2190,7 +2189,7 @@
           <a:p>
             <a:fld id="{62CD7716-E68F-4B01-8ADA-26CD6F61229D}" type="datetimeFigureOut">
               <a:rPr lang="es-CR" smtClean="0"/>
-              <a:t>9/8/2017</a:t>
+              <a:t>19/3/2019</a:t>
             </a:fld>
             <a:endParaRPr lang="es-CR"/>
           </a:p>
@@ -2321,7 +2320,7 @@
           <a:p>
             <a:fld id="{62CD7716-E68F-4B01-8ADA-26CD6F61229D}" type="datetimeFigureOut">
               <a:rPr lang="es-CR" smtClean="0"/>
-              <a:t>9/8/2017</a:t>
+              <a:t>19/3/2019</a:t>
             </a:fld>
             <a:endParaRPr lang="es-CR"/>
           </a:p>
@@ -2421,7 +2420,7 @@
           <a:p>
             <a:fld id="{62CD7716-E68F-4B01-8ADA-26CD6F61229D}" type="datetimeFigureOut">
               <a:rPr lang="es-CR" smtClean="0"/>
-              <a:t>9/8/2017</a:t>
+              <a:t>19/3/2019</a:t>
             </a:fld>
             <a:endParaRPr lang="es-CR"/>
           </a:p>
@@ -2666,7 +2665,7 @@
           <a:p>
             <a:fld id="{62CD7716-E68F-4B01-8ADA-26CD6F61229D}" type="datetimeFigureOut">
               <a:rPr lang="es-CR" smtClean="0"/>
-              <a:t>9/8/2017</a:t>
+              <a:t>19/3/2019</a:t>
             </a:fld>
             <a:endParaRPr lang="es-CR"/>
           </a:p>
@@ -2910,7 +2909,7 @@
           <a:p>
             <a:fld id="{62CD7716-E68F-4B01-8ADA-26CD6F61229D}" type="datetimeFigureOut">
               <a:rPr lang="es-CR" smtClean="0"/>
-              <a:t>9/8/2017</a:t>
+              <a:t>19/3/2019</a:t>
             </a:fld>
             <a:endParaRPr lang="es-CR"/>
           </a:p>
@@ -3734,7 +3733,7 @@
           <a:p>
             <a:fld id="{62CD7716-E68F-4B01-8ADA-26CD6F61229D}" type="datetimeFigureOut">
               <a:rPr lang="es-CR" smtClean="0"/>
-              <a:t>9/8/2017</a:t>
+              <a:t>19/3/2019</a:t>
             </a:fld>
             <a:endParaRPr lang="es-CR"/>
           </a:p>
@@ -4430,7 +4429,7 @@
                 <a:latin typeface="Times New Roman" panose="02020603050405020304" pitchFamily="18" charset="0"/>
                 <a:cs typeface="Times New Roman" panose="02020603050405020304" pitchFamily="18" charset="0"/>
               </a:rPr>
-              <a:t>GPU programming basics using CUDA </a:t>
+              <a:t>GPU Programming Basics with CUDA </a:t>
             </a:r>
             <a:r>
               <a:rPr lang="en-US" sz="1980" dirty="0">
@@ -4487,7 +4486,7 @@
                 <a:latin typeface="Times New Roman" panose="02020603050405020304" pitchFamily="18" charset="0"/>
                 <a:cs typeface="Times New Roman" panose="02020603050405020304" pitchFamily="18" charset="0"/>
               </a:rPr>
-              <a:t>from January 18</a:t>
+              <a:t>from January 15</a:t>
             </a:r>
             <a:r>
               <a:rPr lang="en-US" sz="1210" baseline="30000" dirty="0">
@@ -4507,7 +4506,7 @@
                 <a:latin typeface="Times New Roman" panose="02020603050405020304" pitchFamily="18" charset="0"/>
                 <a:cs typeface="Times New Roman" panose="02020603050405020304" pitchFamily="18" charset="0"/>
               </a:rPr>
-              <a:t> to March 1</a:t>
+              <a:t> to March 13</a:t>
             </a:r>
             <a:r>
               <a:rPr lang="en-US" sz="1210" baseline="30000" dirty="0">
@@ -4517,7 +4516,7 @@
                 <a:latin typeface="Times New Roman" panose="02020603050405020304" pitchFamily="18" charset="0"/>
                 <a:cs typeface="Times New Roman" panose="02020603050405020304" pitchFamily="18" charset="0"/>
               </a:rPr>
-              <a:t>st</a:t>
+              <a:t>th</a:t>
             </a:r>
             <a:r>
               <a:rPr lang="en-US" sz="1210" dirty="0">
@@ -4527,7 +4526,7 @@
                 <a:latin typeface="Times New Roman" panose="02020603050405020304" pitchFamily="18" charset="0"/>
                 <a:cs typeface="Times New Roman" panose="02020603050405020304" pitchFamily="18" charset="0"/>
               </a:rPr>
-              <a:t>, 2017.</a:t>
+              <a:t>, 2019.</a:t>
             </a:r>
             <a:br>
               <a:rPr lang="en-US" sz="1540" dirty="0">
@@ -5197,7 +5196,7 @@
                 <a:latin typeface="Times New Roman" panose="02020603050405020304" pitchFamily="18" charset="0"/>
                 <a:cs typeface="Times New Roman" panose="02020603050405020304" pitchFamily="18" charset="0"/>
               </a:rPr>
-              <a:t>GPU programming basics using CUDA </a:t>
+              <a:t>GPU Programming Basics with CUDA </a:t>
             </a:r>
             <a:r>
               <a:rPr lang="en-US" sz="1980" dirty="0">
@@ -5254,7 +5253,7 @@
                 <a:latin typeface="Times New Roman" panose="02020603050405020304" pitchFamily="18" charset="0"/>
                 <a:cs typeface="Times New Roman" panose="02020603050405020304" pitchFamily="18" charset="0"/>
               </a:rPr>
-              <a:t>from January 18</a:t>
+              <a:t>from January 15</a:t>
             </a:r>
             <a:r>
               <a:rPr lang="en-US" sz="1210" baseline="30000" dirty="0">
@@ -5274,7 +5273,7 @@
                 <a:latin typeface="Times New Roman" panose="02020603050405020304" pitchFamily="18" charset="0"/>
                 <a:cs typeface="Times New Roman" panose="02020603050405020304" pitchFamily="18" charset="0"/>
               </a:rPr>
-              <a:t> to March 1</a:t>
+              <a:t> to March 13</a:t>
             </a:r>
             <a:r>
               <a:rPr lang="en-US" sz="1210" baseline="30000" dirty="0">
@@ -5284,7 +5283,7 @@
                 <a:latin typeface="Times New Roman" panose="02020603050405020304" pitchFamily="18" charset="0"/>
                 <a:cs typeface="Times New Roman" panose="02020603050405020304" pitchFamily="18" charset="0"/>
               </a:rPr>
-              <a:t>st</a:t>
+              <a:t>th</a:t>
             </a:r>
             <a:r>
               <a:rPr lang="en-US" sz="1210" dirty="0">
@@ -5294,7 +5293,7 @@
                 <a:latin typeface="Times New Roman" panose="02020603050405020304" pitchFamily="18" charset="0"/>
                 <a:cs typeface="Times New Roman" panose="02020603050405020304" pitchFamily="18" charset="0"/>
               </a:rPr>
-              <a:t>, 2017.</a:t>
+              <a:t>, 2019.</a:t>
             </a:r>
             <a:br>
               <a:rPr lang="en-US" sz="1540" dirty="0">
@@ -5632,763 +5631,6 @@
     <p:extLst>
       <p:ext uri="{BB962C8B-B14F-4D97-AF65-F5344CB8AC3E}">
         <p14:creationId xmlns:p14="http://schemas.microsoft.com/office/powerpoint/2010/main" val="2378098063"/>
-      </p:ext>
-    </p:extLst>
-  </p:cSld>
-  <p:clrMapOvr>
-    <a:masterClrMapping/>
-  </p:clrMapOvr>
-</p:sld>
-</file>
-
-<file path=ppt/slides/slide3.xml><?xml version="1.0" encoding="utf-8"?>
-<p:sld xmlns:a="http://schemas.openxmlformats.org/drawingml/2006/main" xmlns:r="http://schemas.openxmlformats.org/officeDocument/2006/relationships" xmlns:p="http://schemas.openxmlformats.org/presentationml/2006/main">
-  <p:cSld>
-    <p:spTree>
-      <p:nvGrpSpPr>
-        <p:cNvPr id="1" name=""/>
-        <p:cNvGrpSpPr/>
-        <p:nvPr/>
-      </p:nvGrpSpPr>
-      <p:grpSpPr>
-        <a:xfrm>
-          <a:off x="0" y="0"/>
-          <a:ext cx="0" cy="0"/>
-          <a:chOff x="0" y="0"/>
-          <a:chExt cx="0" cy="0"/>
-        </a:xfrm>
-      </p:grpSpPr>
-      <p:sp>
-        <p:nvSpPr>
-          <p:cNvPr id="4" name="3 Rectángulo"/>
-          <p:cNvSpPr/>
-          <p:nvPr/>
-        </p:nvSpPr>
-        <p:spPr>
-          <a:xfrm>
-            <a:off x="0" y="-44607"/>
-            <a:ext cx="10058400" cy="4290847"/>
-          </a:xfrm>
-          <a:prstGeom prst="rect">
-            <a:avLst/>
-          </a:prstGeom>
-          <a:ln>
-            <a:noFill/>
-          </a:ln>
-        </p:spPr>
-        <p:style>
-          <a:lnRef idx="2">
-            <a:schemeClr val="accent6"/>
-          </a:lnRef>
-          <a:fillRef idx="1">
-            <a:schemeClr val="lt1"/>
-          </a:fillRef>
-          <a:effectRef idx="0">
-            <a:schemeClr val="accent6"/>
-          </a:effectRef>
-          <a:fontRef idx="minor">
-            <a:schemeClr val="dk1"/>
-          </a:fontRef>
-        </p:style>
-        <p:txBody>
-          <a:bodyPr rtlCol="0" anchor="ctr"/>
-          <a:lstStyle/>
-          <a:p>
-            <a:pPr algn="ctr"/>
-            <a:endParaRPr lang="es-CR" sz="2376"/>
-          </a:p>
-        </p:txBody>
-      </p:sp>
-      <p:pic>
-        <p:nvPicPr>
-          <p:cNvPr id="1026" name="Picture 2" descr="Image result for nvidia"/>
-          <p:cNvPicPr>
-            <a:picLocks noChangeAspect="1" noChangeArrowheads="1"/>
-          </p:cNvPicPr>
-          <p:nvPr/>
-        </p:nvPicPr>
-        <p:blipFill>
-          <a:blip r:embed="rId2" cstate="print">
-            <a:extLst>
-              <a:ext uri="{28A0092B-C50C-407E-A947-70E740481C1C}">
-                <a14:useLocalDpi xmlns:a14="http://schemas.microsoft.com/office/drawing/2010/main" val="0"/>
-              </a:ext>
-            </a:extLst>
-          </a:blip>
-          <a:srcRect/>
-          <a:stretch>
-            <a:fillRect/>
-          </a:stretch>
-        </p:blipFill>
-        <p:spPr bwMode="auto">
-          <a:xfrm>
-            <a:off x="7186174" y="139906"/>
-            <a:ext cx="2872227" cy="2018765"/>
-          </a:xfrm>
-          <a:prstGeom prst="rect">
-            <a:avLst/>
-          </a:prstGeom>
-          <a:noFill/>
-          <a:extLst>
-            <a:ext uri="{909E8E84-426E-40DD-AFC4-6F175D3DCCD1}">
-              <a14:hiddenFill xmlns:a14="http://schemas.microsoft.com/office/drawing/2010/main">
-                <a:solidFill>
-                  <a:srgbClr val="FFFFFF"/>
-                </a:solidFill>
-              </a14:hiddenFill>
-            </a:ext>
-          </a:extLst>
-        </p:spPr>
-      </p:pic>
-      <p:sp>
-        <p:nvSpPr>
-          <p:cNvPr id="2" name="1 Título"/>
-          <p:cNvSpPr>
-            <a:spLocks noGrp="1"/>
-          </p:cNvSpPr>
-          <p:nvPr>
-            <p:ph type="ctrTitle"/>
-          </p:nvPr>
-        </p:nvSpPr>
-        <p:spPr>
-          <a:xfrm>
-            <a:off x="0" y="114300"/>
-            <a:ext cx="10058400" cy="7543800"/>
-          </a:xfrm>
-        </p:spPr>
-        <p:txBody>
-          <a:bodyPr>
-            <a:normAutofit/>
-          </a:bodyPr>
-          <a:lstStyle/>
-          <a:p>
-            <a:pPr algn="ctr"/>
-            <a:br>
-              <a:rPr lang="en-US" sz="2640" dirty="0">
-                <a:solidFill>
-                  <a:schemeClr val="tx1"/>
-                </a:solidFill>
-                <a:latin typeface="Times New Roman" panose="02020603050405020304" pitchFamily="18" charset="0"/>
-                <a:cs typeface="Times New Roman" panose="02020603050405020304" pitchFamily="18" charset="0"/>
-              </a:rPr>
-            </a:br>
-            <a:br>
-              <a:rPr lang="en-US" sz="2640" dirty="0">
-                <a:solidFill>
-                  <a:schemeClr val="tx1"/>
-                </a:solidFill>
-                <a:latin typeface="Times New Roman" panose="02020603050405020304" pitchFamily="18" charset="0"/>
-                <a:cs typeface="Times New Roman" panose="02020603050405020304" pitchFamily="18" charset="0"/>
-              </a:rPr>
-            </a:br>
-            <a:br>
-              <a:rPr lang="en-US" sz="2640" dirty="0">
-                <a:solidFill>
-                  <a:schemeClr val="tx1"/>
-                </a:solidFill>
-                <a:latin typeface="Times New Roman" panose="02020603050405020304" pitchFamily="18" charset="0"/>
-                <a:cs typeface="Times New Roman" panose="02020603050405020304" pitchFamily="18" charset="0"/>
-              </a:rPr>
-            </a:br>
-            <a:br>
-              <a:rPr lang="en-US" sz="2640" dirty="0">
-                <a:solidFill>
-                  <a:schemeClr val="tx1"/>
-                </a:solidFill>
-                <a:latin typeface="Times New Roman" panose="02020603050405020304" pitchFamily="18" charset="0"/>
-                <a:cs typeface="Times New Roman" panose="02020603050405020304" pitchFamily="18" charset="0"/>
-              </a:rPr>
-            </a:br>
-            <a:r>
-              <a:rPr lang="en-US" sz="2640" dirty="0">
-                <a:solidFill>
-                  <a:schemeClr val="tx1"/>
-                </a:solidFill>
-                <a:latin typeface="Times New Roman" panose="02020603050405020304" pitchFamily="18" charset="0"/>
-                <a:cs typeface="Times New Roman" panose="02020603050405020304" pitchFamily="18" charset="0"/>
-              </a:rPr>
-              <a:t>Northeastern University Computer Architecture Research Lab</a:t>
-            </a:r>
-            <a:br>
-              <a:rPr lang="en-US" sz="1540" dirty="0">
-                <a:solidFill>
-                  <a:schemeClr val="tx1"/>
-                </a:solidFill>
-                <a:latin typeface="Times New Roman" panose="02020603050405020304" pitchFamily="18" charset="0"/>
-                <a:cs typeface="Times New Roman" panose="02020603050405020304" pitchFamily="18" charset="0"/>
-              </a:rPr>
-            </a:br>
-            <a:br>
-              <a:rPr lang="en-US" sz="1540" dirty="0">
-                <a:solidFill>
-                  <a:schemeClr val="tx1"/>
-                </a:solidFill>
-                <a:latin typeface="Times New Roman" panose="02020603050405020304" pitchFamily="18" charset="0"/>
-                <a:cs typeface="Times New Roman" panose="02020603050405020304" pitchFamily="18" charset="0"/>
-              </a:rPr>
-            </a:br>
-            <a:br>
-              <a:rPr lang="en-US" sz="1540" dirty="0">
-                <a:solidFill>
-                  <a:schemeClr val="tx1"/>
-                </a:solidFill>
-                <a:latin typeface="Times New Roman" panose="02020603050405020304" pitchFamily="18" charset="0"/>
-                <a:cs typeface="Times New Roman" panose="02020603050405020304" pitchFamily="18" charset="0"/>
-              </a:rPr>
-            </a:br>
-            <a:r>
-              <a:rPr lang="en-US" sz="2200" b="1" dirty="0">
-                <a:solidFill>
-                  <a:schemeClr val="tx1"/>
-                </a:solidFill>
-                <a:latin typeface="Times New Roman" panose="02020603050405020304" pitchFamily="18" charset="0"/>
-                <a:cs typeface="Times New Roman" panose="02020603050405020304" pitchFamily="18" charset="0"/>
-              </a:rPr>
-              <a:t>Certifies that</a:t>
-            </a:r>
-            <a:br>
-              <a:rPr lang="en-US" sz="1540" dirty="0">
-                <a:solidFill>
-                  <a:schemeClr val="tx1"/>
-                </a:solidFill>
-                <a:latin typeface="Times New Roman" panose="02020603050405020304" pitchFamily="18" charset="0"/>
-                <a:cs typeface="Times New Roman" panose="02020603050405020304" pitchFamily="18" charset="0"/>
-              </a:rPr>
-            </a:br>
-            <a:br>
-              <a:rPr lang="en-US" sz="1540" dirty="0">
-                <a:solidFill>
-                  <a:schemeClr val="tx1"/>
-                </a:solidFill>
-                <a:latin typeface="Times New Roman" panose="02020603050405020304" pitchFamily="18" charset="0"/>
-                <a:cs typeface="Times New Roman" panose="02020603050405020304" pitchFamily="18" charset="0"/>
-              </a:rPr>
-            </a:br>
-            <a:br>
-              <a:rPr lang="en-US" sz="1540" dirty="0">
-                <a:solidFill>
-                  <a:schemeClr val="tx1"/>
-                </a:solidFill>
-                <a:latin typeface="Times New Roman" panose="02020603050405020304" pitchFamily="18" charset="0"/>
-                <a:cs typeface="Times New Roman" panose="02020603050405020304" pitchFamily="18" charset="0"/>
-              </a:rPr>
-            </a:br>
-            <a:br>
-              <a:rPr lang="en-US" sz="1540" dirty="0">
-                <a:solidFill>
-                  <a:schemeClr val="tx1"/>
-                </a:solidFill>
-                <a:latin typeface="Times New Roman" panose="02020603050405020304" pitchFamily="18" charset="0"/>
-                <a:cs typeface="Times New Roman" panose="02020603050405020304" pitchFamily="18" charset="0"/>
-              </a:rPr>
-            </a:br>
-            <a:br>
-              <a:rPr lang="en-US" sz="1540" dirty="0">
-                <a:solidFill>
-                  <a:schemeClr val="tx1"/>
-                </a:solidFill>
-                <a:latin typeface="Times New Roman" panose="02020603050405020304" pitchFamily="18" charset="0"/>
-                <a:cs typeface="Times New Roman" panose="02020603050405020304" pitchFamily="18" charset="0"/>
-              </a:rPr>
-            </a:br>
-            <a:br>
-              <a:rPr lang="en-US" sz="1540" dirty="0">
-                <a:solidFill>
-                  <a:schemeClr val="tx1"/>
-                </a:solidFill>
-                <a:latin typeface="Times New Roman" panose="02020603050405020304" pitchFamily="18" charset="0"/>
-                <a:cs typeface="Times New Roman" panose="02020603050405020304" pitchFamily="18" charset="0"/>
-              </a:rPr>
-            </a:br>
-            <a:br>
-              <a:rPr lang="en-US" sz="1540" dirty="0">
-                <a:solidFill>
-                  <a:schemeClr val="tx1"/>
-                </a:solidFill>
-                <a:latin typeface="Times New Roman" panose="02020603050405020304" pitchFamily="18" charset="0"/>
-                <a:cs typeface="Times New Roman" panose="02020603050405020304" pitchFamily="18" charset="0"/>
-              </a:rPr>
-            </a:br>
-            <a:br>
-              <a:rPr lang="en-US" sz="1540" dirty="0">
-                <a:solidFill>
-                  <a:schemeClr val="tx1"/>
-                </a:solidFill>
-                <a:latin typeface="Times New Roman" panose="02020603050405020304" pitchFamily="18" charset="0"/>
-                <a:cs typeface="Times New Roman" panose="02020603050405020304" pitchFamily="18" charset="0"/>
-              </a:rPr>
-            </a:br>
-            <a:br>
-              <a:rPr lang="en-US" sz="1540" dirty="0">
-                <a:solidFill>
-                  <a:schemeClr val="tx1"/>
-                </a:solidFill>
-                <a:latin typeface="Times New Roman" panose="02020603050405020304" pitchFamily="18" charset="0"/>
-                <a:cs typeface="Times New Roman" panose="02020603050405020304" pitchFamily="18" charset="0"/>
-              </a:rPr>
-            </a:br>
-            <a:r>
-              <a:rPr lang="en-US" sz="1980" dirty="0">
-                <a:solidFill>
-                  <a:schemeClr val="tx1"/>
-                </a:solidFill>
-                <a:latin typeface="Times New Roman" panose="02020603050405020304" pitchFamily="18" charset="0"/>
-                <a:cs typeface="Times New Roman" panose="02020603050405020304" pitchFamily="18" charset="0"/>
-              </a:rPr>
-              <a:t>assisted in the coordination and development of the </a:t>
-            </a:r>
-            <a:br>
-              <a:rPr lang="en-US" sz="1980" dirty="0">
-                <a:solidFill>
-                  <a:schemeClr val="tx1"/>
-                </a:solidFill>
-                <a:latin typeface="Times New Roman" panose="02020603050405020304" pitchFamily="18" charset="0"/>
-                <a:cs typeface="Times New Roman" panose="02020603050405020304" pitchFamily="18" charset="0"/>
-              </a:rPr>
-            </a:br>
-            <a:r>
-              <a:rPr lang="en-US" sz="1980" b="1" dirty="0">
-                <a:solidFill>
-                  <a:schemeClr val="tx1"/>
-                </a:solidFill>
-                <a:latin typeface="Times New Roman" panose="02020603050405020304" pitchFamily="18" charset="0"/>
-                <a:cs typeface="Times New Roman" panose="02020603050405020304" pitchFamily="18" charset="0"/>
-              </a:rPr>
-              <a:t>GPU programming basics using CUDA </a:t>
-            </a:r>
-            <a:r>
-              <a:rPr lang="en-US" sz="1980" dirty="0">
-                <a:solidFill>
-                  <a:schemeClr val="tx1"/>
-                </a:solidFill>
-                <a:latin typeface="Times New Roman" panose="02020603050405020304" pitchFamily="18" charset="0"/>
-                <a:cs typeface="Times New Roman" panose="02020603050405020304" pitchFamily="18" charset="0"/>
-              </a:rPr>
-              <a:t>workshop</a:t>
-            </a:r>
-            <a:br>
-              <a:rPr lang="en-US" sz="2640" dirty="0">
-                <a:solidFill>
-                  <a:schemeClr val="tx1"/>
-                </a:solidFill>
-                <a:latin typeface="Times New Roman" panose="02020603050405020304" pitchFamily="18" charset="0"/>
-                <a:cs typeface="Times New Roman" panose="02020603050405020304" pitchFamily="18" charset="0"/>
-              </a:rPr>
-            </a:br>
-            <a:br>
-              <a:rPr lang="en-US" sz="1540" dirty="0">
-                <a:solidFill>
-                  <a:schemeClr val="tx1"/>
-                </a:solidFill>
-                <a:latin typeface="Times New Roman" panose="02020603050405020304" pitchFamily="18" charset="0"/>
-                <a:cs typeface="Times New Roman" panose="02020603050405020304" pitchFamily="18" charset="0"/>
-              </a:rPr>
-            </a:br>
-            <a:r>
-              <a:rPr lang="en-US" sz="1210" dirty="0">
-                <a:solidFill>
-                  <a:schemeClr val="tx1"/>
-                </a:solidFill>
-                <a:latin typeface="Times New Roman" panose="02020603050405020304" pitchFamily="18" charset="0"/>
-                <a:cs typeface="Times New Roman" panose="02020603050405020304" pitchFamily="18" charset="0"/>
-              </a:rPr>
-              <a:t>Organized by NUCAR laboratory from Northeastern University,</a:t>
-            </a:r>
-            <a:br>
-              <a:rPr lang="en-US" sz="1210" dirty="0">
-                <a:solidFill>
-                  <a:schemeClr val="tx1"/>
-                </a:solidFill>
-                <a:latin typeface="Times New Roman" panose="02020603050405020304" pitchFamily="18" charset="0"/>
-                <a:cs typeface="Times New Roman" panose="02020603050405020304" pitchFamily="18" charset="0"/>
-              </a:rPr>
-            </a:br>
-            <a:r>
-              <a:rPr lang="en-US" sz="1210" dirty="0">
-                <a:solidFill>
-                  <a:schemeClr val="tx1"/>
-                </a:solidFill>
-                <a:latin typeface="Times New Roman" panose="02020603050405020304" pitchFamily="18" charset="0"/>
-                <a:cs typeface="Times New Roman" panose="02020603050405020304" pitchFamily="18" charset="0"/>
-              </a:rPr>
-              <a:t>from January 18</a:t>
-            </a:r>
-            <a:r>
-              <a:rPr lang="en-US" sz="1210" baseline="30000" dirty="0">
-                <a:solidFill>
-                  <a:schemeClr val="tx1"/>
-                </a:solidFill>
-                <a:latin typeface="Times New Roman" panose="02020603050405020304" pitchFamily="18" charset="0"/>
-                <a:cs typeface="Times New Roman" panose="02020603050405020304" pitchFamily="18" charset="0"/>
-              </a:rPr>
-              <a:t>th</a:t>
-            </a:r>
-            <a:r>
-              <a:rPr lang="en-US" sz="1210" dirty="0">
-                <a:solidFill>
-                  <a:schemeClr val="tx1"/>
-                </a:solidFill>
-                <a:latin typeface="Times New Roman" panose="02020603050405020304" pitchFamily="18" charset="0"/>
-                <a:cs typeface="Times New Roman" panose="02020603050405020304" pitchFamily="18" charset="0"/>
-              </a:rPr>
-              <a:t> to March 1</a:t>
-            </a:r>
-            <a:r>
-              <a:rPr lang="en-US" sz="1210" baseline="30000" dirty="0">
-                <a:solidFill>
-                  <a:schemeClr val="tx1"/>
-                </a:solidFill>
-                <a:latin typeface="Times New Roman" panose="02020603050405020304" pitchFamily="18" charset="0"/>
-                <a:cs typeface="Times New Roman" panose="02020603050405020304" pitchFamily="18" charset="0"/>
-              </a:rPr>
-              <a:t>st</a:t>
-            </a:r>
-            <a:r>
-              <a:rPr lang="en-US" sz="1210" dirty="0">
-                <a:solidFill>
-                  <a:schemeClr val="tx1"/>
-                </a:solidFill>
-                <a:latin typeface="Times New Roman" panose="02020603050405020304" pitchFamily="18" charset="0"/>
-                <a:cs typeface="Times New Roman" panose="02020603050405020304" pitchFamily="18" charset="0"/>
-              </a:rPr>
-              <a:t>, 2017.</a:t>
-            </a:r>
-            <a:br>
-              <a:rPr lang="en-US" sz="1540" dirty="0">
-                <a:solidFill>
-                  <a:schemeClr val="tx1"/>
-                </a:solidFill>
-                <a:latin typeface="Times New Roman" panose="02020603050405020304" pitchFamily="18" charset="0"/>
-                <a:cs typeface="Times New Roman" panose="02020603050405020304" pitchFamily="18" charset="0"/>
-              </a:rPr>
-            </a:br>
-            <a:br>
-              <a:rPr lang="en-US" sz="1540" dirty="0">
-                <a:solidFill>
-                  <a:schemeClr val="tx1"/>
-                </a:solidFill>
-                <a:latin typeface="Times New Roman" panose="02020603050405020304" pitchFamily="18" charset="0"/>
-                <a:cs typeface="Times New Roman" panose="02020603050405020304" pitchFamily="18" charset="0"/>
-              </a:rPr>
-            </a:br>
-            <a:br>
-              <a:rPr lang="en-US" sz="1540" dirty="0">
-                <a:solidFill>
-                  <a:schemeClr val="tx1"/>
-                </a:solidFill>
-                <a:latin typeface="Times New Roman" panose="02020603050405020304" pitchFamily="18" charset="0"/>
-                <a:cs typeface="Times New Roman" panose="02020603050405020304" pitchFamily="18" charset="0"/>
-              </a:rPr>
-            </a:br>
-            <a:br>
-              <a:rPr lang="en-US" sz="1540" dirty="0">
-                <a:solidFill>
-                  <a:schemeClr val="tx1"/>
-                </a:solidFill>
-                <a:latin typeface="Times New Roman" panose="02020603050405020304" pitchFamily="18" charset="0"/>
-                <a:cs typeface="Times New Roman" panose="02020603050405020304" pitchFamily="18" charset="0"/>
-              </a:rPr>
-            </a:br>
-            <a:br>
-              <a:rPr lang="en-US" sz="1540" dirty="0">
-                <a:solidFill>
-                  <a:schemeClr val="tx1"/>
-                </a:solidFill>
-                <a:latin typeface="Times New Roman" panose="02020603050405020304" pitchFamily="18" charset="0"/>
-                <a:cs typeface="Times New Roman" panose="02020603050405020304" pitchFamily="18" charset="0"/>
-              </a:rPr>
-            </a:br>
-            <a:br>
-              <a:rPr lang="en-US" sz="1540" dirty="0">
-                <a:solidFill>
-                  <a:schemeClr val="tx1"/>
-                </a:solidFill>
-                <a:latin typeface="Times New Roman" panose="02020603050405020304" pitchFamily="18" charset="0"/>
-                <a:cs typeface="Times New Roman" panose="02020603050405020304" pitchFamily="18" charset="0"/>
-              </a:rPr>
-            </a:br>
-            <a:endParaRPr lang="en-US" sz="1540" dirty="0">
-              <a:solidFill>
-                <a:schemeClr val="tx1"/>
-              </a:solidFill>
-              <a:latin typeface="Times New Roman" panose="02020603050405020304" pitchFamily="18" charset="0"/>
-              <a:cs typeface="Times New Roman" panose="02020603050405020304" pitchFamily="18" charset="0"/>
-            </a:endParaRPr>
-          </a:p>
-        </p:txBody>
-      </p:sp>
-      <p:sp>
-        <p:nvSpPr>
-          <p:cNvPr id="5" name="4 CuadroTexto"/>
-          <p:cNvSpPr txBox="1"/>
-          <p:nvPr/>
-        </p:nvSpPr>
-        <p:spPr>
-          <a:xfrm>
-            <a:off x="1531464" y="6882039"/>
-            <a:ext cx="1808508" cy="464743"/>
-          </a:xfrm>
-          <a:prstGeom prst="rect">
-            <a:avLst/>
-          </a:prstGeom>
-          <a:noFill/>
-        </p:spPr>
-        <p:txBody>
-          <a:bodyPr wrap="none" rtlCol="0">
-            <a:spAutoFit/>
-          </a:bodyPr>
-          <a:lstStyle/>
-          <a:p>
-            <a:pPr algn="ctr"/>
-            <a:r>
-              <a:rPr lang="es-CR" sz="1210" dirty="0"/>
-              <a:t>Julián Gutiérrez Monge</a:t>
-            </a:r>
-          </a:p>
-          <a:p>
-            <a:pPr algn="ctr"/>
-            <a:r>
-              <a:rPr lang="es-CR" sz="1210" b="1" dirty="0" err="1"/>
-              <a:t>Coordinator</a:t>
-            </a:r>
-            <a:endParaRPr lang="es-CR" sz="1210" b="1" dirty="0"/>
-          </a:p>
-        </p:txBody>
-      </p:sp>
-      <p:sp>
-        <p:nvSpPr>
-          <p:cNvPr id="9" name="8 CuadroTexto"/>
-          <p:cNvSpPr txBox="1"/>
-          <p:nvPr/>
-        </p:nvSpPr>
-        <p:spPr>
-          <a:xfrm>
-            <a:off x="6718432" y="6882039"/>
-            <a:ext cx="1510350" cy="464743"/>
-          </a:xfrm>
-          <a:prstGeom prst="rect">
-            <a:avLst/>
-          </a:prstGeom>
-          <a:noFill/>
-        </p:spPr>
-        <p:txBody>
-          <a:bodyPr wrap="none" rtlCol="0">
-            <a:spAutoFit/>
-          </a:bodyPr>
-          <a:lstStyle/>
-          <a:p>
-            <a:pPr algn="ctr"/>
-            <a:r>
-              <a:rPr lang="es-CR" sz="1210" dirty="0"/>
-              <a:t>Dr. David Kaeli</a:t>
-            </a:r>
-          </a:p>
-          <a:p>
-            <a:pPr algn="ctr"/>
-            <a:r>
-              <a:rPr lang="es-CR" sz="1210" b="1" dirty="0"/>
-              <a:t>NUCAR Director</a:t>
-            </a:r>
-          </a:p>
-        </p:txBody>
-      </p:sp>
-      <p:sp>
-        <p:nvSpPr>
-          <p:cNvPr id="6" name="5 CuadroTexto"/>
-          <p:cNvSpPr txBox="1"/>
-          <p:nvPr/>
-        </p:nvSpPr>
-        <p:spPr>
-          <a:xfrm>
-            <a:off x="0" y="3094115"/>
-            <a:ext cx="10058400" cy="1107996"/>
-          </a:xfrm>
-          <a:prstGeom prst="rect">
-            <a:avLst/>
-          </a:prstGeom>
-          <a:noFill/>
-        </p:spPr>
-        <p:txBody>
-          <a:bodyPr wrap="square" rtlCol="0">
-            <a:spAutoFit/>
-          </a:bodyPr>
-          <a:lstStyle/>
-          <a:p>
-            <a:pPr algn="ctr"/>
-            <a:r>
-              <a:rPr lang="es-CR" sz="6600" dirty="0">
-                <a:latin typeface="French Script MT" panose="03020402040607040605" pitchFamily="66" charset="0"/>
-              </a:rPr>
-              <a:t>&lt;</a:t>
-            </a:r>
-            <a:r>
-              <a:rPr lang="es-CR" sz="6600" dirty="0" err="1">
-                <a:latin typeface="French Script MT" panose="03020402040607040605" pitchFamily="66" charset="0"/>
-              </a:rPr>
-              <a:t>Name</a:t>
-            </a:r>
-            <a:r>
-              <a:rPr lang="es-CR" sz="6600" dirty="0">
-                <a:latin typeface="French Script MT" panose="03020402040607040605" pitchFamily="66" charset="0"/>
-              </a:rPr>
-              <a:t>&gt;</a:t>
-            </a:r>
-          </a:p>
-        </p:txBody>
-      </p:sp>
-      <p:sp>
-        <p:nvSpPr>
-          <p:cNvPr id="3" name="AutoShape 2" descr="Displaying INGENIERIAlogoCOLOR.jpg"/>
-          <p:cNvSpPr>
-            <a:spLocks noChangeAspect="1" noChangeArrowheads="1"/>
-          </p:cNvSpPr>
-          <p:nvPr/>
-        </p:nvSpPr>
-        <p:spPr bwMode="auto">
-          <a:xfrm>
-            <a:off x="171133" y="-44607"/>
-            <a:ext cx="335280" cy="335281"/>
-          </a:xfrm>
-          <a:prstGeom prst="rect">
-            <a:avLst/>
-          </a:prstGeom>
-          <a:noFill/>
-          <a:extLst>
-            <a:ext uri="{909E8E84-426E-40DD-AFC4-6F175D3DCCD1}">
-              <a14:hiddenFill xmlns:a14="http://schemas.microsoft.com/office/drawing/2010/main">
-                <a:solidFill>
-                  <a:srgbClr val="FFFFFF"/>
-                </a:solidFill>
-              </a14:hiddenFill>
-            </a:ext>
-          </a:extLst>
-        </p:spPr>
-        <p:txBody>
-          <a:bodyPr vert="horz" wrap="square" lIns="100584" tIns="50292" rIns="100584" bIns="50292" numCol="1" anchor="t" anchorCtr="0" compatLnSpc="1">
-            <a:prstTxWarp prst="textNoShape">
-              <a:avLst/>
-            </a:prstTxWarp>
-          </a:bodyPr>
-          <a:lstStyle/>
-          <a:p>
-            <a:endParaRPr lang="es-CR" sz="2376"/>
-          </a:p>
-        </p:txBody>
-      </p:sp>
-      <p:sp>
-        <p:nvSpPr>
-          <p:cNvPr id="7" name="AutoShape 4" descr="Displaying INGENIERIAlogoCOLOR.jpg"/>
-          <p:cNvSpPr>
-            <a:spLocks noChangeAspect="1" noChangeArrowheads="1"/>
-          </p:cNvSpPr>
-          <p:nvPr/>
-        </p:nvSpPr>
-        <p:spPr bwMode="auto">
-          <a:xfrm>
-            <a:off x="338773" y="123035"/>
-            <a:ext cx="335280" cy="335281"/>
-          </a:xfrm>
-          <a:prstGeom prst="rect">
-            <a:avLst/>
-          </a:prstGeom>
-          <a:noFill/>
-          <a:extLst>
-            <a:ext uri="{909E8E84-426E-40DD-AFC4-6F175D3DCCD1}">
-              <a14:hiddenFill xmlns:a14="http://schemas.microsoft.com/office/drawing/2010/main">
-                <a:solidFill>
-                  <a:srgbClr val="FFFFFF"/>
-                </a:solidFill>
-              </a14:hiddenFill>
-            </a:ext>
-          </a:extLst>
-        </p:spPr>
-        <p:txBody>
-          <a:bodyPr vert="horz" wrap="square" lIns="100584" tIns="50292" rIns="100584" bIns="50292" numCol="1" anchor="t" anchorCtr="0" compatLnSpc="1">
-            <a:prstTxWarp prst="textNoShape">
-              <a:avLst/>
-            </a:prstTxWarp>
-          </a:bodyPr>
-          <a:lstStyle/>
-          <a:p>
-            <a:endParaRPr lang="es-CR" sz="2376"/>
-          </a:p>
-        </p:txBody>
-      </p:sp>
-      <p:pic>
-        <p:nvPicPr>
-          <p:cNvPr id="15" name="Picture 14" descr="http://www.ece.neu.edu/groups/nucar/img/nucar.png"/>
-          <p:cNvPicPr>
-            <a:picLocks noChangeAspect="1" noChangeArrowheads="1"/>
-          </p:cNvPicPr>
-          <p:nvPr/>
-        </p:nvPicPr>
-        <p:blipFill>
-          <a:blip r:embed="rId3">
-            <a:extLst>
-              <a:ext uri="{28A0092B-C50C-407E-A947-70E740481C1C}">
-                <a14:useLocalDpi xmlns:a14="http://schemas.microsoft.com/office/drawing/2010/main" val="0"/>
-              </a:ext>
-            </a:extLst>
-          </a:blip>
-          <a:srcRect/>
-          <a:stretch>
-            <a:fillRect/>
-          </a:stretch>
-        </p:blipFill>
-        <p:spPr bwMode="auto">
-          <a:xfrm>
-            <a:off x="3339972" y="790326"/>
-            <a:ext cx="3378460" cy="717923"/>
-          </a:xfrm>
-          <a:prstGeom prst="rect">
-            <a:avLst/>
-          </a:prstGeom>
-          <a:noFill/>
-          <a:extLst>
-            <a:ext uri="{909E8E84-426E-40DD-AFC4-6F175D3DCCD1}">
-              <a14:hiddenFill xmlns:a14="http://schemas.microsoft.com/office/drawing/2010/main">
-                <a:solidFill>
-                  <a:srgbClr val="FFFFFF"/>
-                </a:solidFill>
-              </a14:hiddenFill>
-            </a:ext>
-          </a:extLst>
-        </p:spPr>
-      </p:pic>
-      <p:pic>
-        <p:nvPicPr>
-          <p:cNvPr id="26" name="Picture 25"/>
-          <p:cNvPicPr>
-            <a:picLocks noChangeAspect="1"/>
-          </p:cNvPicPr>
-          <p:nvPr/>
-        </p:nvPicPr>
-        <p:blipFill>
-          <a:blip r:embed="rId4" cstate="print">
-            <a:extLst>
-              <a:ext uri="{28A0092B-C50C-407E-A947-70E740481C1C}">
-                <a14:useLocalDpi xmlns:a14="http://schemas.microsoft.com/office/drawing/2010/main" val="0"/>
-              </a:ext>
-            </a:extLst>
-          </a:blip>
-          <a:stretch>
-            <a:fillRect/>
-          </a:stretch>
-        </p:blipFill>
-        <p:spPr>
-          <a:xfrm>
-            <a:off x="577957" y="467046"/>
-            <a:ext cx="1367968" cy="1367968"/>
-          </a:xfrm>
-          <a:prstGeom prst="rect">
-            <a:avLst/>
-          </a:prstGeom>
-        </p:spPr>
-      </p:pic>
-    </p:spTree>
-    <p:extLst>
-      <p:ext uri="{BB962C8B-B14F-4D97-AF65-F5344CB8AC3E}">
-        <p14:creationId xmlns:p14="http://schemas.microsoft.com/office/powerpoint/2010/main" val="277889508"/>
       </p:ext>
     </p:extLst>
   </p:cSld>

</xml_diff>